<commit_message>
updated slides, final version XPDays
</commit_message>
<xml_diff>
--- a/slidesXPDays.pptx
+++ b/slidesXPDays.pptx
@@ -6,22 +6,24 @@
     <p:sldMasterId id="2147493481" r:id="rId5"/>
   </p:sldMasterIdLst>
   <p:notesMasterIdLst>
-    <p:notesMasterId r:id="rId16"/>
+    <p:notesMasterId r:id="rId18"/>
   </p:notesMasterIdLst>
   <p:handoutMasterIdLst>
-    <p:handoutMasterId r:id="rId17"/>
+    <p:handoutMasterId r:id="rId19"/>
   </p:handoutMasterIdLst>
   <p:sldIdLst>
     <p:sldId id="264" r:id="rId6"/>
-    <p:sldId id="265" r:id="rId7"/>
-    <p:sldId id="267" r:id="rId8"/>
-    <p:sldId id="266" r:id="rId9"/>
-    <p:sldId id="282" r:id="rId10"/>
-    <p:sldId id="281" r:id="rId11"/>
-    <p:sldId id="270" r:id="rId12"/>
-    <p:sldId id="269" r:id="rId13"/>
-    <p:sldId id="278" r:id="rId14"/>
-    <p:sldId id="280" r:id="rId15"/>
+    <p:sldId id="267" r:id="rId7"/>
+    <p:sldId id="266" r:id="rId8"/>
+    <p:sldId id="282" r:id="rId9"/>
+    <p:sldId id="281" r:id="rId10"/>
+    <p:sldId id="270" r:id="rId11"/>
+    <p:sldId id="269" r:id="rId12"/>
+    <p:sldId id="278" r:id="rId13"/>
+    <p:sldId id="283" r:id="rId14"/>
+    <p:sldId id="284" r:id="rId15"/>
+    <p:sldId id="285" r:id="rId16"/>
+    <p:sldId id="280" r:id="rId17"/>
   </p:sldIdLst>
   <p:sldSz cx="9144000" cy="5143500" type="screen16x9"/>
   <p:notesSz cx="6881813" cy="9661525"/>
@@ -225,7 +227,7 @@
           <a:p>
             <a:fld id="{1869EC12-32BB-B84B-964B-77CD8A6EA5B5}" type="datetimeFigureOut">
               <a:rPr lang="de-DE" smtClean="0"/>
-              <a:t>15.09.2017</a:t>
+              <a:t>28.09.2017</a:t>
             </a:fld>
             <a:endParaRPr lang="de-DE" dirty="0"/>
           </a:p>
@@ -391,7 +393,7 @@
           <a:p>
             <a:fld id="{396D8CEF-220A-EC43-8099-BAE7D65DBE3D}" type="datetimeFigureOut">
               <a:rPr lang="de-DE" smtClean="0"/>
-              <a:t>15.09.2017</a:t>
+              <a:t>28.09.2017</a:t>
             </a:fld>
             <a:endParaRPr lang="de-DE" dirty="0"/>
           </a:p>
@@ -738,7 +740,7 @@
           <a:p>
             <a:fld id="{5F0FCDCF-7A11-A043-9155-2050B044F50A}" type="slidenum">
               <a:rPr lang="de-DE" smtClean="0"/>
-              <a:t>5</a:t>
+              <a:t>4</a:t>
             </a:fld>
             <a:endParaRPr lang="de-DE" dirty="0"/>
           </a:p>
@@ -882,7 +884,7 @@
           <a:p>
             <a:fld id="{5F0FCDCF-7A11-A043-9155-2050B044F50A}" type="slidenum">
               <a:rPr lang="de-DE" smtClean="0"/>
-              <a:t>8</a:t>
+              <a:t>7</a:t>
             </a:fld>
             <a:endParaRPr lang="de-DE" dirty="0"/>
           </a:p>
@@ -5640,19 +5642,31 @@
           <a:lstStyle/>
           <a:p>
             <a:r>
-              <a:rPr lang="de-DE" sz="7200" dirty="0"/>
+              <a:rPr lang="de-DE" sz="8800" dirty="0">
+                <a:solidFill>
+                  <a:schemeClr val="accent1"/>
+                </a:solidFill>
+              </a:rPr>
               <a:t>06.10.2017</a:t>
             </a:r>
           </a:p>
           <a:p>
             <a:r>
-              <a:rPr lang="de-DE" sz="7200" dirty="0"/>
+              <a:rPr lang="de-DE" sz="8800" dirty="0">
+                <a:solidFill>
+                  <a:schemeClr val="accent1"/>
+                </a:solidFill>
+              </a:rPr>
               <a:t>Christoph Kurrat</a:t>
             </a:r>
           </a:p>
           <a:p>
             <a:r>
-              <a:rPr lang="de-DE" sz="7200" dirty="0"/>
+              <a:rPr lang="de-DE" sz="8800" dirty="0">
+                <a:solidFill>
+                  <a:schemeClr val="accent1"/>
+                </a:solidFill>
+              </a:rPr>
               <a:t>Dr. Bonnie Chow</a:t>
             </a:r>
           </a:p>
@@ -5682,11 +5696,11 @@
               <a:rPr lang="de-DE" b="1" dirty="0"/>
             </a:br>
             <a:r>
-              <a:rPr lang="de-DE" b="1" dirty="0"/>
+              <a:rPr lang="de-DE" sz="3100" b="1" dirty="0"/>
               <a:t>Spring Boot und Spring Data | Einfache Integrationstests und Schnelle </a:t>
             </a:r>
             <a:r>
-              <a:rPr lang="de-DE" b="1" dirty="0" err="1"/>
+              <a:rPr lang="de-DE" sz="3100" b="1" dirty="0" err="1"/>
               <a:t>Featureentwicklung</a:t>
             </a:r>
             <a:br>
@@ -5847,6 +5861,378 @@
           <a:p>
             <a:r>
               <a:rPr lang="de-DE" dirty="0"/>
+              <a:t>Integrationstest schreiben!</a:t>
+            </a:r>
+            <a:endParaRPr lang="en-GB" dirty="0"/>
+          </a:p>
+        </p:txBody>
+      </p:sp>
+      <p:sp>
+        <p:nvSpPr>
+          <p:cNvPr id="6" name="Textplatzhalter 5"/>
+          <p:cNvSpPr>
+            <a:spLocks noGrp="1"/>
+          </p:cNvSpPr>
+          <p:nvPr>
+            <p:ph type="body" sz="quarter" idx="12"/>
+          </p:nvPr>
+        </p:nvSpPr>
+        <p:spPr/>
+        <p:txBody>
+          <a:bodyPr/>
+          <a:lstStyle/>
+          <a:p>
+            <a:pPr>
+              <a:buFont typeface="Wingdings" panose="05000000000000000000" pitchFamily="2" charset="2"/>
+              <a:buChar char="Ø"/>
+            </a:pPr>
+            <a:r>
+              <a:rPr lang="en-US" dirty="0"/>
+              <a:t>@</a:t>
+            </a:r>
+            <a:r>
+              <a:rPr lang="en-US" dirty="0" err="1"/>
+              <a:t>DataJpaTest</a:t>
+            </a:r>
+            <a:r>
+              <a:rPr lang="en-US" dirty="0"/>
+              <a:t> </a:t>
+            </a:r>
+          </a:p>
+          <a:p>
+            <a:pPr>
+              <a:buFont typeface="Wingdings" panose="05000000000000000000" pitchFamily="2" charset="2"/>
+              <a:buChar char="Ø"/>
+            </a:pPr>
+            <a:r>
+              <a:rPr lang="en-US" dirty="0" err="1"/>
+              <a:t>Implementiere</a:t>
+            </a:r>
+            <a:r>
+              <a:rPr lang="en-US" dirty="0"/>
+              <a:t> </a:t>
+            </a:r>
+            <a:r>
+              <a:rPr lang="en-US" dirty="0" err="1"/>
+              <a:t>einen</a:t>
+            </a:r>
+            <a:r>
+              <a:rPr lang="en-US" dirty="0"/>
+              <a:t> Test f</a:t>
+            </a:r>
+            <a:r>
+              <a:rPr lang="de-DE" dirty="0" err="1"/>
+              <a:t>ür</a:t>
+            </a:r>
+            <a:r>
+              <a:rPr lang="de-DE" dirty="0"/>
+              <a:t> die Suche</a:t>
+            </a:r>
+            <a:endParaRPr lang="en-US" dirty="0"/>
+          </a:p>
+          <a:p>
+            <a:pPr marL="0" indent="0">
+              <a:buNone/>
+            </a:pPr>
+            <a:endParaRPr lang="en-US" dirty="0"/>
+          </a:p>
+          <a:p>
+            <a:pPr marL="0" indent="0">
+              <a:buNone/>
+            </a:pPr>
+            <a:endParaRPr lang="de-DE" dirty="0"/>
+          </a:p>
+          <a:p>
+            <a:endParaRPr lang="en-GB" dirty="0"/>
+          </a:p>
+        </p:txBody>
+      </p:sp>
+    </p:spTree>
+    <p:extLst>
+      <p:ext uri="{BB962C8B-B14F-4D97-AF65-F5344CB8AC3E}">
+        <p14:creationId xmlns:p14="http://schemas.microsoft.com/office/powerpoint/2010/main" val="2629049980"/>
+      </p:ext>
+    </p:extLst>
+  </p:cSld>
+  <p:clrMapOvr>
+    <a:masterClrMapping/>
+  </p:clrMapOvr>
+</p:sld>
+</file>
+
+<file path=ppt/slides/slide11.xml><?xml version="1.0" encoding="utf-8"?>
+<p:sld xmlns:a="http://schemas.openxmlformats.org/drawingml/2006/main" xmlns:r="http://schemas.openxmlformats.org/officeDocument/2006/relationships" xmlns:p="http://schemas.openxmlformats.org/presentationml/2006/main">
+  <p:cSld>
+    <p:spTree>
+      <p:nvGrpSpPr>
+        <p:cNvPr id="1" name=""/>
+        <p:cNvGrpSpPr/>
+        <p:nvPr/>
+      </p:nvGrpSpPr>
+      <p:grpSpPr>
+        <a:xfrm>
+          <a:off x="0" y="0"/>
+          <a:ext cx="0" cy="0"/>
+          <a:chOff x="0" y="0"/>
+          <a:chExt cx="0" cy="0"/>
+        </a:xfrm>
+      </p:grpSpPr>
+      <p:sp>
+        <p:nvSpPr>
+          <p:cNvPr id="3" name="Fußzeilenplatzhalter 2"/>
+          <p:cNvSpPr>
+            <a:spLocks noGrp="1"/>
+          </p:cNvSpPr>
+          <p:nvPr>
+            <p:ph type="ftr" sz="quarter" idx="10"/>
+          </p:nvPr>
+        </p:nvSpPr>
+        <p:spPr/>
+        <p:txBody>
+          <a:bodyPr/>
+          <a:lstStyle/>
+          <a:p>
+            <a:r>
+              <a:rPr lang="en-US"/>
+              <a:t>Experts in agile software engineering</a:t>
+            </a:r>
+            <a:endParaRPr lang="de-DE" dirty="0"/>
+          </a:p>
+        </p:txBody>
+      </p:sp>
+      <p:sp>
+        <p:nvSpPr>
+          <p:cNvPr id="4" name="Foliennummernplatzhalter 3"/>
+          <p:cNvSpPr>
+            <a:spLocks noGrp="1"/>
+          </p:cNvSpPr>
+          <p:nvPr>
+            <p:ph type="sldNum" sz="quarter" idx="11"/>
+          </p:nvPr>
+        </p:nvSpPr>
+        <p:spPr/>
+        <p:txBody>
+          <a:bodyPr/>
+          <a:lstStyle/>
+          <a:p>
+            <a:fld id="{6C6AE60A-B69C-4790-82F7-3882EDF23186}" type="slidenum">
+              <a:rPr lang="de-DE" smtClean="0"/>
+              <a:pPr/>
+              <a:t>11</a:t>
+            </a:fld>
+            <a:endParaRPr lang="de-DE" dirty="0"/>
+          </a:p>
+        </p:txBody>
+      </p:sp>
+      <p:sp>
+        <p:nvSpPr>
+          <p:cNvPr id="5" name="Titel 4"/>
+          <p:cNvSpPr>
+            <a:spLocks noGrp="1"/>
+          </p:cNvSpPr>
+          <p:nvPr>
+            <p:ph type="title"/>
+          </p:nvPr>
+        </p:nvSpPr>
+        <p:spPr>
+          <a:xfrm>
+            <a:off x="457200" y="1813252"/>
+            <a:ext cx="8229600" cy="783696"/>
+          </a:xfrm>
+        </p:spPr>
+        <p:txBody>
+          <a:bodyPr>
+            <a:noAutofit/>
+          </a:bodyPr>
+          <a:lstStyle/>
+          <a:p>
+            <a:pPr algn="ctr"/>
+            <a:r>
+              <a:rPr lang="de-DE" sz="4000" dirty="0"/>
+              <a:t>Danke </a:t>
+            </a:r>
+            <a:r>
+              <a:rPr lang="de-DE" sz="4000" dirty="0">
+                <a:sym typeface="Wingdings" panose="05000000000000000000" pitchFamily="2" charset="2"/>
+              </a:rPr>
+              <a:t></a:t>
+            </a:r>
+            <a:br>
+              <a:rPr lang="de-DE" sz="4000" dirty="0">
+                <a:sym typeface="Wingdings" panose="05000000000000000000" pitchFamily="2" charset="2"/>
+              </a:rPr>
+            </a:br>
+            <a:br>
+              <a:rPr lang="de-DE" sz="4000" dirty="0">
+                <a:sym typeface="Wingdings" panose="05000000000000000000" pitchFamily="2" charset="2"/>
+              </a:rPr>
+            </a:br>
+            <a:r>
+              <a:rPr lang="de-DE" sz="4000" dirty="0">
+                <a:sym typeface="Wingdings" panose="05000000000000000000" pitchFamily="2" charset="2"/>
+              </a:rPr>
+              <a:t>Fragen?</a:t>
+            </a:r>
+            <a:endParaRPr lang="en-GB" sz="4000" dirty="0"/>
+          </a:p>
+        </p:txBody>
+      </p:sp>
+      <p:sp>
+        <p:nvSpPr>
+          <p:cNvPr id="2" name="Textplatzhalter 1"/>
+          <p:cNvSpPr>
+            <a:spLocks noGrp="1"/>
+          </p:cNvSpPr>
+          <p:nvPr>
+            <p:ph type="body" sz="quarter" idx="12"/>
+          </p:nvPr>
+        </p:nvSpPr>
+        <p:spPr>
+          <a:xfrm>
+            <a:off x="457200" y="3916218"/>
+            <a:ext cx="8229600" cy="792942"/>
+          </a:xfrm>
+        </p:spPr>
+        <p:txBody>
+          <a:bodyPr>
+            <a:normAutofit/>
+          </a:bodyPr>
+          <a:lstStyle/>
+          <a:p>
+            <a:pPr marL="0" indent="0">
+              <a:buNone/>
+            </a:pPr>
+            <a:r>
+              <a:rPr lang="de-DE" sz="2000" dirty="0" err="1">
+                <a:solidFill>
+                  <a:schemeClr val="accent1"/>
+                </a:solidFill>
+              </a:rPr>
+              <a:t>christoph.kurrat</a:t>
+            </a:r>
+            <a:r>
+              <a:rPr lang="en-US" sz="2000" dirty="0">
+                <a:solidFill>
+                  <a:schemeClr val="accent1"/>
+                </a:solidFill>
+              </a:rPr>
+              <a:t>@andrena.de</a:t>
+            </a:r>
+          </a:p>
+          <a:p>
+            <a:pPr marL="0" indent="0">
+              <a:buNone/>
+            </a:pPr>
+            <a:r>
+              <a:rPr lang="en-US" sz="2000" dirty="0">
+                <a:solidFill>
+                  <a:schemeClr val="accent1"/>
+                </a:solidFill>
+              </a:rPr>
+              <a:t>bonnie.chow@andrena.de </a:t>
+            </a:r>
+            <a:endParaRPr lang="de-DE" sz="2000" dirty="0">
+              <a:solidFill>
+                <a:schemeClr val="accent1"/>
+              </a:solidFill>
+            </a:endParaRPr>
+          </a:p>
+        </p:txBody>
+      </p:sp>
+    </p:spTree>
+    <p:extLst>
+      <p:ext uri="{BB962C8B-B14F-4D97-AF65-F5344CB8AC3E}">
+        <p14:creationId xmlns:p14="http://schemas.microsoft.com/office/powerpoint/2010/main" val="3693784711"/>
+      </p:ext>
+    </p:extLst>
+  </p:cSld>
+  <p:clrMapOvr>
+    <a:masterClrMapping/>
+  </p:clrMapOvr>
+</p:sld>
+</file>
+
+<file path=ppt/slides/slide12.xml><?xml version="1.0" encoding="utf-8"?>
+<p:sld xmlns:a="http://schemas.openxmlformats.org/drawingml/2006/main" xmlns:r="http://schemas.openxmlformats.org/officeDocument/2006/relationships" xmlns:p="http://schemas.openxmlformats.org/presentationml/2006/main">
+  <p:cSld>
+    <p:spTree>
+      <p:nvGrpSpPr>
+        <p:cNvPr id="1" name=""/>
+        <p:cNvGrpSpPr/>
+        <p:nvPr/>
+      </p:nvGrpSpPr>
+      <p:grpSpPr>
+        <a:xfrm>
+          <a:off x="0" y="0"/>
+          <a:ext cx="0" cy="0"/>
+          <a:chOff x="0" y="0"/>
+          <a:chExt cx="0" cy="0"/>
+        </a:xfrm>
+      </p:grpSpPr>
+      <p:sp>
+        <p:nvSpPr>
+          <p:cNvPr id="3" name="Fußzeilenplatzhalter 2"/>
+          <p:cNvSpPr>
+            <a:spLocks noGrp="1"/>
+          </p:cNvSpPr>
+          <p:nvPr>
+            <p:ph type="ftr" sz="quarter" idx="10"/>
+          </p:nvPr>
+        </p:nvSpPr>
+        <p:spPr/>
+        <p:txBody>
+          <a:bodyPr/>
+          <a:lstStyle/>
+          <a:p>
+            <a:r>
+              <a:rPr lang="en-US"/>
+              <a:t>Experts in agile software engineering</a:t>
+            </a:r>
+            <a:endParaRPr lang="de-DE" dirty="0"/>
+          </a:p>
+        </p:txBody>
+      </p:sp>
+      <p:sp>
+        <p:nvSpPr>
+          <p:cNvPr id="4" name="Foliennummernplatzhalter 3"/>
+          <p:cNvSpPr>
+            <a:spLocks noGrp="1"/>
+          </p:cNvSpPr>
+          <p:nvPr>
+            <p:ph type="sldNum" sz="quarter" idx="11"/>
+          </p:nvPr>
+        </p:nvSpPr>
+        <p:spPr/>
+        <p:txBody>
+          <a:bodyPr/>
+          <a:lstStyle/>
+          <a:p>
+            <a:fld id="{6C6AE60A-B69C-4790-82F7-3882EDF23186}" type="slidenum">
+              <a:rPr lang="de-DE" smtClean="0"/>
+              <a:pPr/>
+              <a:t>12</a:t>
+            </a:fld>
+            <a:endParaRPr lang="de-DE" dirty="0"/>
+          </a:p>
+        </p:txBody>
+      </p:sp>
+      <p:sp>
+        <p:nvSpPr>
+          <p:cNvPr id="5" name="Titel 4"/>
+          <p:cNvSpPr>
+            <a:spLocks noGrp="1"/>
+          </p:cNvSpPr>
+          <p:nvPr>
+            <p:ph type="title"/>
+          </p:nvPr>
+        </p:nvSpPr>
+        <p:spPr/>
+        <p:txBody>
+          <a:bodyPr/>
+          <a:lstStyle/>
+          <a:p>
+            <a:r>
+              <a:rPr lang="de-DE" dirty="0"/>
               <a:t>Further Reading + </a:t>
             </a:r>
             <a:r>
@@ -5972,7 +6358,7 @@
       </p:grpSpPr>
       <p:sp>
         <p:nvSpPr>
-          <p:cNvPr id="4" name="Fußzeilenplatzhalter 3"/>
+          <p:cNvPr id="2" name="Fußzeilenplatzhalter 1"/>
           <p:cNvSpPr>
             <a:spLocks noGrp="1"/>
           </p:cNvSpPr>
@@ -5995,7 +6381,7 @@
       </p:sp>
       <p:sp>
         <p:nvSpPr>
-          <p:cNvPr id="5" name="Foliennummernplatzhalter 4"/>
+          <p:cNvPr id="3" name="Foliennummernplatzhalter 2"/>
           <p:cNvSpPr>
             <a:spLocks noGrp="1"/>
           </p:cNvSpPr>
@@ -6019,7 +6405,7 @@
       </p:sp>
       <p:sp>
         <p:nvSpPr>
-          <p:cNvPr id="6" name="Titel 5"/>
+          <p:cNvPr id="4" name="Titel 3"/>
           <p:cNvSpPr>
             <a:spLocks noGrp="1"/>
           </p:cNvSpPr>
@@ -6034,14 +6420,14 @@
           <a:p>
             <a:r>
               <a:rPr lang="de-DE" dirty="0"/>
-              <a:t>Spring Framework</a:t>
-            </a:r>
-          </a:p>
-        </p:txBody>
-      </p:sp>
-      <p:sp>
-        <p:nvSpPr>
-          <p:cNvPr id="7" name="Textplatzhalter 6"/>
+              <a:t>Spring Boot</a:t>
+            </a:r>
+          </a:p>
+        </p:txBody>
+      </p:sp>
+      <p:sp>
+        <p:nvSpPr>
+          <p:cNvPr id="5" name="Textplatzhalter 4"/>
           <p:cNvSpPr>
             <a:spLocks noGrp="1"/>
           </p:cNvSpPr>
@@ -6055,74 +6441,81 @@
           <a:lstStyle/>
           <a:p>
             <a:r>
+              <a:rPr lang="de-DE" dirty="0"/>
+              <a:t>Vereinfacht Infrastruktur-Setup und </a:t>
+            </a:r>
+            <a:r>
+              <a:rPr lang="de-DE" dirty="0" err="1"/>
+              <a:t>Resourcenverwaltung</a:t>
+            </a:r>
+            <a:endParaRPr lang="de-DE" dirty="0"/>
+          </a:p>
+          <a:p>
+            <a:r>
+              <a:rPr lang="de-DE" dirty="0"/>
+              <a:t>Bietet die Springprojekte als fertige “Starter” Bundles an, z.B. als </a:t>
+            </a:r>
+            <a:r>
+              <a:rPr lang="de-DE" dirty="0" err="1"/>
+              <a:t>Maven</a:t>
+            </a:r>
+            <a:r>
+              <a:rPr lang="de-DE" dirty="0"/>
+              <a:t> Artefakte</a:t>
+            </a:r>
+          </a:p>
+          <a:p>
+            <a:r>
               <a:rPr lang="en-US" dirty="0"/>
-              <a:t>“</a:t>
-            </a:r>
-            <a:r>
-              <a:rPr lang="de-DE" dirty="0"/>
-              <a:t>Inversion </a:t>
+              <a:t>Convention over Configuration (+ und -)</a:t>
+            </a:r>
+          </a:p>
+          <a:p>
+            <a:r>
+              <a:rPr lang="de-DE" dirty="0"/>
+              <a:t>Generiert “</a:t>
             </a:r>
             <a:r>
               <a:rPr lang="de-DE" dirty="0" err="1"/>
-              <a:t>of</a:t>
-            </a:r>
-            <a:r>
-              <a:rPr lang="de-DE" dirty="0"/>
-              <a:t> Control“ Framework für Java </a:t>
-            </a:r>
-          </a:p>
-          <a:p>
-            <a:r>
-              <a:rPr lang="de-DE" dirty="0"/>
-              <a:t>Setzt auf </a:t>
-            </a:r>
-            <a:r>
-              <a:rPr lang="en-US" dirty="0"/>
-              <a:t>“</a:t>
+              <a:t>fat</a:t>
+            </a:r>
+            <a:r>
+              <a:rPr lang="de-DE" dirty="0"/>
+              <a:t> </a:t>
             </a:r>
             <a:r>
               <a:rPr lang="de-DE" dirty="0" err="1"/>
-              <a:t>Convention</a:t>
-            </a:r>
-            <a:r>
-              <a:rPr lang="de-DE" dirty="0"/>
-              <a:t> </a:t>
+              <a:t>jars</a:t>
+            </a:r>
+            <a:r>
+              <a:rPr lang="de-DE" dirty="0"/>
+              <a:t>” die sämtliche Abhängigkeiten + einen </a:t>
             </a:r>
             <a:r>
               <a:rPr lang="de-DE" dirty="0" err="1"/>
-              <a:t>over</a:t>
-            </a:r>
-            <a:r>
-              <a:rPr lang="de-DE" dirty="0"/>
-              <a:t> </a:t>
-            </a:r>
-            <a:r>
-              <a:rPr lang="de-DE" dirty="0" err="1"/>
-              <a:t>Configuration</a:t>
-            </a:r>
-            <a:r>
-              <a:rPr lang="de-DE" dirty="0"/>
-              <a:t>„</a:t>
-            </a:r>
-          </a:p>
-          <a:p>
-            <a:r>
-              <a:rPr lang="de-DE" dirty="0"/>
-              <a:t>Vereinfacht die Infrastruktur-Setup und </a:t>
-            </a:r>
-            <a:r>
-              <a:rPr lang="de-DE" dirty="0" err="1"/>
-              <a:t>Resourceverwaltung</a:t>
-            </a:r>
-            <a:endParaRPr lang="de-DE" dirty="0"/>
-          </a:p>
-          <a:p>
-            <a:r>
-              <a:rPr lang="de-DE" dirty="0"/>
-              <a:t>Viel Unterstützung für Datenbankzugriff …</a:t>
-            </a:r>
-          </a:p>
-          <a:p>
+              <a:t>Applicationserver</a:t>
+            </a:r>
+            <a:r>
+              <a:rPr lang="de-DE" dirty="0"/>
+              <a:t> enthalten</a:t>
+            </a:r>
+          </a:p>
+          <a:p>
+            <a:r>
+              <a:rPr lang="de-DE" dirty="0"/>
+              <a:t>einfache und aussagekräftige </a:t>
+            </a:r>
+            <a:r>
+              <a:rPr lang="de-DE" i="1" dirty="0"/>
+              <a:t>Integrationstests</a:t>
+            </a:r>
+            <a:r>
+              <a:rPr lang="de-DE" dirty="0"/>
+              <a:t> mit spring-boot-test</a:t>
+            </a:r>
+          </a:p>
+          <a:p>
+            <a:pPr lvl="1"/>
             <a:endParaRPr lang="de-DE" dirty="0"/>
           </a:p>
         </p:txBody>
@@ -6130,7 +6523,7 @@
     </p:spTree>
     <p:extLst>
       <p:ext uri="{BB962C8B-B14F-4D97-AF65-F5344CB8AC3E}">
-        <p14:creationId xmlns:p14="http://schemas.microsoft.com/office/powerpoint/2010/main" val="3675965672"/>
+        <p14:creationId xmlns:p14="http://schemas.microsoft.com/office/powerpoint/2010/main" val="3827873249"/>
       </p:ext>
     </p:extLst>
   </p:cSld>
@@ -6221,7 +6614,7 @@
           <a:p>
             <a:r>
               <a:rPr lang="de-DE" dirty="0"/>
-              <a:t>Spring Boot</a:t>
+              <a:t>Spring Data</a:t>
             </a:r>
           </a:p>
         </p:txBody>
@@ -6238,94 +6631,101 @@
         </p:nvSpPr>
         <p:spPr/>
         <p:txBody>
-          <a:bodyPr/>
-          <a:lstStyle/>
-          <a:p>
-            <a:r>
-              <a:rPr lang="de-DE" dirty="0"/>
-              <a:t>Bietet die Springprojekte als fertige “Starter” </a:t>
+          <a:bodyPr>
+            <a:normAutofit/>
+          </a:bodyPr>
+          <a:lstStyle/>
+          <a:p>
+            <a:r>
+              <a:rPr lang="de-DE" dirty="0"/>
+              <a:t>Bietet Schnittstelle zu DBs</a:t>
+            </a:r>
+          </a:p>
+          <a:p>
+            <a:pPr lvl="1"/>
+            <a:r>
+              <a:rPr lang="de-DE" dirty="0"/>
+              <a:t>Keine </a:t>
             </a:r>
             <a:r>
               <a:rPr lang="de-DE" dirty="0" err="1"/>
-              <a:t>bundles</a:t>
-            </a:r>
-            <a:r>
-              <a:rPr lang="de-DE" dirty="0"/>
-              <a:t> an, z.B. als </a:t>
+              <a:t>Queries</a:t>
+            </a:r>
+            <a:r>
+              <a:rPr lang="de-DE" dirty="0"/>
+              <a:t> mehr schreiben</a:t>
+            </a:r>
+          </a:p>
+          <a:p>
+            <a:r>
+              <a:rPr lang="de-DE" dirty="0"/>
+              <a:t>Unterstützt viele DBMS (SQL + </a:t>
             </a:r>
             <a:r>
               <a:rPr lang="de-DE" dirty="0" err="1"/>
-              <a:t>Maven</a:t>
-            </a:r>
-            <a:r>
-              <a:rPr lang="de-DE" dirty="0"/>
-              <a:t> Artefakte</a:t>
-            </a:r>
-          </a:p>
-          <a:p>
-            <a:r>
-              <a:rPr lang="en-US" dirty="0" err="1"/>
-              <a:t>Treibt</a:t>
-            </a:r>
-            <a:r>
-              <a:rPr lang="en-US" dirty="0"/>
-              <a:t> Convention over Configuration </a:t>
-            </a:r>
-            <a:r>
-              <a:rPr lang="en-US" dirty="0" err="1"/>
-              <a:t>weiter</a:t>
-            </a:r>
-            <a:r>
-              <a:rPr lang="en-US" dirty="0"/>
-              <a:t> (+  und -)</a:t>
-            </a:r>
-          </a:p>
-          <a:p>
-            <a:r>
-              <a:rPr lang="de-DE" dirty="0"/>
-              <a:t>Generiert “</a:t>
+              <a:t>NoSQL</a:t>
+            </a:r>
+            <a:r>
+              <a:rPr lang="de-DE" dirty="0"/>
+              <a:t>)</a:t>
+            </a:r>
+          </a:p>
+          <a:p>
+            <a:r>
+              <a:rPr lang="de-DE" dirty="0"/>
+              <a:t>Bietet diese Schnittstellen als REST-</a:t>
             </a:r>
             <a:r>
               <a:rPr lang="de-DE" dirty="0" err="1"/>
-              <a:t>fat</a:t>
-            </a:r>
-            <a:r>
-              <a:rPr lang="de-DE" dirty="0"/>
-              <a:t> </a:t>
+              <a:t>Resourcen</a:t>
+            </a:r>
+            <a:endParaRPr lang="de-DE" dirty="0"/>
+          </a:p>
+          <a:p>
+            <a:pPr lvl="1"/>
+            <a:r>
+              <a:rPr lang="de-DE" dirty="0"/>
+              <a:t>Weniger / kein </a:t>
             </a:r>
             <a:r>
               <a:rPr lang="de-DE" dirty="0" err="1"/>
-              <a:t>jars</a:t>
-            </a:r>
-            <a:r>
-              <a:rPr lang="de-DE" dirty="0"/>
-              <a:t>” die sämtliche Abhängigkeiten + einen </a:t>
+              <a:t>Boilerplatecode</a:t>
+            </a:r>
+            <a:r>
+              <a:rPr lang="de-DE" dirty="0"/>
+              <a:t> mehr</a:t>
+            </a:r>
+          </a:p>
+          <a:p>
+            <a:pPr lvl="1"/>
+            <a:r>
+              <a:rPr lang="de-DE" dirty="0"/>
+              <a:t>Ideal für Single Page </a:t>
             </a:r>
             <a:r>
               <a:rPr lang="de-DE" dirty="0" err="1"/>
-              <a:t>Applicationserver</a:t>
-            </a:r>
-            <a:r>
-              <a:rPr lang="de-DE" dirty="0"/>
-              <a:t> enthalten</a:t>
-            </a:r>
-          </a:p>
-          <a:p>
-            <a:r>
-              <a:rPr lang="de-DE" dirty="0"/>
-              <a:t>einfache und aussagekräftige Integrationstests mit spring-boot-test</a:t>
-            </a:r>
-          </a:p>
-          <a:p>
-            <a:pPr lvl="1"/>
+              <a:t>Applications</a:t>
+            </a:r>
             <a:endParaRPr lang="de-DE" dirty="0"/>
+          </a:p>
+          <a:p>
+            <a:r>
+              <a:rPr lang="de-DE" dirty="0"/>
+              <a:t>HAL-Browser</a:t>
+            </a:r>
+          </a:p>
+          <a:p>
+            <a:r>
+              <a:rPr lang="de-DE" dirty="0"/>
+              <a:t>Ist anpassbar</a:t>
+            </a:r>
           </a:p>
         </p:txBody>
       </p:sp>
     </p:spTree>
     <p:extLst>
       <p:ext uri="{BB962C8B-B14F-4D97-AF65-F5344CB8AC3E}">
-        <p14:creationId xmlns:p14="http://schemas.microsoft.com/office/powerpoint/2010/main" val="3827873249"/>
+        <p14:creationId xmlns:p14="http://schemas.microsoft.com/office/powerpoint/2010/main" val="3249461432"/>
       </p:ext>
     </p:extLst>
   </p:cSld>
@@ -6416,7 +6816,7 @@
           <a:p>
             <a:r>
               <a:rPr lang="de-DE" dirty="0"/>
-              <a:t>Spring Data</a:t>
+              <a:t>Das Beispielprojekt - Technologien</a:t>
             </a:r>
           </a:p>
         </p:txBody>
@@ -6439,95 +6839,61 @@
           <a:lstStyle/>
           <a:p>
             <a:r>
-              <a:rPr lang="de-DE" dirty="0"/>
-              <a:t>Bietet Schnittstelle zu DBs</a:t>
-            </a:r>
-          </a:p>
-          <a:p>
-            <a:pPr lvl="1"/>
-            <a:r>
-              <a:rPr lang="de-DE" dirty="0"/>
-              <a:t>Keine </a:t>
-            </a:r>
-            <a:r>
               <a:rPr lang="de-DE" dirty="0" err="1"/>
-              <a:t>Queries</a:t>
-            </a:r>
-            <a:r>
-              <a:rPr lang="de-DE" dirty="0"/>
-              <a:t> mehr schreiben müssen</a:t>
-            </a:r>
-          </a:p>
-          <a:p>
-            <a:r>
-              <a:rPr lang="de-DE" dirty="0"/>
-              <a:t>Unterstützt viele DBMS (SQL + </a:t>
-            </a:r>
+              <a:t>Maven</a:t>
+            </a:r>
+            <a:endParaRPr lang="de-DE" dirty="0"/>
+          </a:p>
+          <a:p>
+            <a:r>
+              <a:rPr lang="de-DE" dirty="0"/>
+              <a:t>Spring</a:t>
+            </a:r>
+          </a:p>
+          <a:p>
+            <a:r>
+              <a:rPr lang="de-DE" dirty="0"/>
+              <a:t>Spring Boot </a:t>
+            </a:r>
+          </a:p>
+          <a:p>
+            <a:r>
+              <a:rPr lang="de-DE" dirty="0"/>
+              <a:t>Spring Data</a:t>
+            </a:r>
+          </a:p>
+          <a:p>
+            <a:r>
+              <a:rPr lang="de-DE" dirty="0"/>
+              <a:t>Java8</a:t>
+            </a:r>
+          </a:p>
+          <a:p>
             <a:r>
               <a:rPr lang="de-DE" dirty="0" err="1"/>
-              <a:t>NoSQL</a:t>
-            </a:r>
-            <a:r>
-              <a:rPr lang="de-DE" dirty="0"/>
-              <a:t>)</a:t>
-            </a:r>
-          </a:p>
-          <a:p>
-            <a:r>
-              <a:rPr lang="de-DE" dirty="0"/>
-              <a:t>Bietet diese Schnittstellen als REST-</a:t>
-            </a:r>
+              <a:t>Thymeleaf</a:t>
+            </a:r>
+            <a:endParaRPr lang="de-DE" dirty="0"/>
+          </a:p>
+          <a:p>
+            <a:r>
+              <a:rPr lang="de-DE" dirty="0"/>
+              <a:t>H2 DB</a:t>
+            </a:r>
+          </a:p>
+          <a:p>
             <a:r>
               <a:rPr lang="de-DE" dirty="0" err="1"/>
-              <a:t>Resourcen</a:t>
+              <a:t>Hibernate</a:t>
             </a:r>
             <a:endParaRPr lang="de-DE" dirty="0"/>
-          </a:p>
-          <a:p>
-            <a:pPr lvl="1"/>
-            <a:r>
-              <a:rPr lang="de-DE" dirty="0"/>
-              <a:t>Weniger / kein </a:t>
-            </a:r>
-            <a:r>
-              <a:rPr lang="de-DE" dirty="0" err="1"/>
-              <a:t>Boilerplatecode</a:t>
-            </a:r>
-            <a:r>
-              <a:rPr lang="de-DE" dirty="0"/>
-              <a:t> mehr</a:t>
-            </a:r>
-          </a:p>
-          <a:p>
-            <a:pPr lvl="1"/>
-            <a:r>
-              <a:rPr lang="de-DE" dirty="0"/>
-              <a:t>Ideal für Single Page </a:t>
-            </a:r>
-            <a:r>
-              <a:rPr lang="de-DE" dirty="0" err="1"/>
-              <a:t>Applications</a:t>
-            </a:r>
-            <a:endParaRPr lang="de-DE" dirty="0"/>
-          </a:p>
-          <a:p>
-            <a:r>
-              <a:rPr lang="de-DE" dirty="0"/>
-              <a:t>HAL-Browser</a:t>
-            </a:r>
-          </a:p>
-          <a:p>
-            <a:r>
-              <a:rPr lang="de-DE" dirty="0"/>
-              <a:t>Ist anpassbar</a:t>
-            </a:r>
           </a:p>
         </p:txBody>
       </p:sp>
     </p:spTree>
     <p:extLst>
       <p:ext uri="{BB962C8B-B14F-4D97-AF65-F5344CB8AC3E}">
-        <p14:creationId xmlns:p14="http://schemas.microsoft.com/office/powerpoint/2010/main" val="3249461432"/>
+        <p14:creationId xmlns:p14="http://schemas.microsoft.com/office/powerpoint/2010/main" val="1413780197"/>
       </p:ext>
     </p:extLst>
   </p:cSld>
@@ -6618,14 +6984,29 @@
           <a:p>
             <a:r>
               <a:rPr lang="de-DE" dirty="0"/>
-              <a:t>Das Beispielprojekt - Technologien</a:t>
-            </a:r>
-          </a:p>
-        </p:txBody>
-      </p:sp>
-      <p:sp>
-        <p:nvSpPr>
-          <p:cNvPr id="5" name="Textplatzhalter 4"/>
+              <a:t>Das Beispielprojekt – </a:t>
+            </a:r>
+            <a:r>
+              <a:rPr lang="de-DE" dirty="0" err="1"/>
+              <a:t>Explore</a:t>
+            </a:r>
+            <a:r>
+              <a:rPr lang="de-DE" dirty="0"/>
+              <a:t> </a:t>
+            </a:r>
+            <a:r>
+              <a:rPr lang="de-DE" dirty="0">
+                <a:sym typeface="Wingdings" panose="05000000000000000000" pitchFamily="2" charset="2"/>
+              </a:rPr>
+              <a:t></a:t>
+            </a:r>
+            <a:endParaRPr lang="de-DE" dirty="0"/>
+          </a:p>
+        </p:txBody>
+      </p:sp>
+      <p:sp>
+        <p:nvSpPr>
+          <p:cNvPr id="9" name="Textplatzhalter 8"/>
           <p:cNvSpPr>
             <a:spLocks noGrp="1"/>
           </p:cNvSpPr>
@@ -6635,58 +7016,54 @@
         </p:nvSpPr>
         <p:spPr/>
         <p:txBody>
-          <a:bodyPr>
-            <a:normAutofit/>
-          </a:bodyPr>
-          <a:lstStyle/>
+          <a:bodyPr/>
+          <a:lstStyle/>
+          <a:p>
+            <a:r>
+              <a:rPr lang="de-DE" dirty="0"/>
+              <a:t>Projekt von GitHub auschecken ************** LINKS ANPASSEN</a:t>
+            </a:r>
+            <a:br>
+              <a:rPr lang="de-DE" dirty="0"/>
+            </a:br>
+            <a:r>
+              <a:rPr lang="de-DE" dirty="0">
+                <a:hlinkClick r:id="rId2"/>
+              </a:rPr>
+              <a:t>https://github.com/bonnie-chow/springBoot-springData.git</a:t>
+            </a:r>
+            <a:br>
+              <a:rPr lang="de-DE" dirty="0"/>
+            </a:br>
+            <a:r>
+              <a:rPr lang="de-DE" dirty="0">
+                <a:hlinkClick r:id="rId3"/>
+              </a:rPr>
+              <a:t>https://github.com/bonnie-chow/springBoot-springData-client.git</a:t>
+            </a:r>
+            <a:endParaRPr lang="de-DE" dirty="0"/>
+          </a:p>
           <a:p>
             <a:r>
               <a:rPr lang="de-DE" dirty="0" err="1"/>
-              <a:t>Maven</a:t>
+              <a:t>mvnw</a:t>
+            </a:r>
+            <a:r>
+              <a:rPr lang="de-DE" dirty="0"/>
+              <a:t> clean </a:t>
+            </a:r>
+            <a:r>
+              <a:rPr lang="de-DE" dirty="0" err="1"/>
+              <a:t>install</a:t>
             </a:r>
             <a:endParaRPr lang="de-DE" dirty="0"/>
           </a:p>
           <a:p>
             <a:r>
-              <a:rPr lang="de-DE" dirty="0"/>
-              <a:t>Spring</a:t>
-            </a:r>
-          </a:p>
-          <a:p>
-            <a:r>
-              <a:rPr lang="de-DE" dirty="0"/>
-              <a:t>Spring Boot </a:t>
-            </a:r>
-          </a:p>
-          <a:p>
-            <a:r>
-              <a:rPr lang="de-DE" dirty="0"/>
-              <a:t>Spring Data</a:t>
-            </a:r>
-          </a:p>
-          <a:p>
-            <a:r>
-              <a:rPr lang="de-DE" dirty="0"/>
-              <a:t>Java8</a:t>
-            </a:r>
-          </a:p>
-          <a:p>
-            <a:r>
-              <a:rPr lang="de-DE" dirty="0" err="1"/>
-              <a:t>Thymeleaf</a:t>
-            </a:r>
-            <a:endParaRPr lang="de-DE" dirty="0"/>
-          </a:p>
-          <a:p>
-            <a:r>
-              <a:rPr lang="de-DE" dirty="0"/>
-              <a:t>H2 DB</a:t>
-            </a:r>
-          </a:p>
-          <a:p>
-            <a:r>
-              <a:rPr lang="de-DE" dirty="0" err="1"/>
-              <a:t>Hibernate</a:t>
+              <a:rPr lang="de-DE" dirty="0">
+                <a:hlinkClick r:id="rId4"/>
+              </a:rPr>
+              <a:t>http://localhost:8090/agenda</a:t>
             </a:r>
             <a:endParaRPr lang="de-DE" dirty="0"/>
           </a:p>
@@ -6695,7 +7072,7 @@
     </p:spTree>
     <p:extLst>
       <p:ext uri="{BB962C8B-B14F-4D97-AF65-F5344CB8AC3E}">
-        <p14:creationId xmlns:p14="http://schemas.microsoft.com/office/powerpoint/2010/main" val="1413780197"/>
+        <p14:creationId xmlns:p14="http://schemas.microsoft.com/office/powerpoint/2010/main" val="579743785"/>
       </p:ext>
     </p:extLst>
   </p:cSld>
@@ -6724,31 +7101,7 @@
       </p:grpSpPr>
       <p:sp>
         <p:nvSpPr>
-          <p:cNvPr id="8" name="Textplatzhalter 7"/>
-          <p:cNvSpPr>
-            <a:spLocks noGrp="1"/>
-          </p:cNvSpPr>
-          <p:nvPr>
-            <p:ph type="body" sz="half" idx="2"/>
-          </p:nvPr>
-        </p:nvSpPr>
-        <p:spPr/>
-        <p:txBody>
-          <a:bodyPr>
-            <a:normAutofit fontScale="85000" lnSpcReduction="10000"/>
-          </a:bodyPr>
-          <a:lstStyle/>
-          <a:p>
-            <a:r>
-              <a:rPr lang="de-DE" dirty="0"/>
-              <a:t>30 Min</a:t>
-            </a:r>
-          </a:p>
-        </p:txBody>
-      </p:sp>
-      <p:sp>
-        <p:nvSpPr>
-          <p:cNvPr id="2" name="Fußzeilenplatzhalter 1"/>
+          <p:cNvPr id="3" name="Fußzeilenplatzhalter 2"/>
           <p:cNvSpPr>
             <a:spLocks noGrp="1"/>
           </p:cNvSpPr>
@@ -6771,7 +7124,7 @@
       </p:sp>
       <p:sp>
         <p:nvSpPr>
-          <p:cNvPr id="3" name="Foliennummernplatzhalter 2"/>
+          <p:cNvPr id="4" name="Foliennummernplatzhalter 3"/>
           <p:cNvSpPr>
             <a:spLocks noGrp="1"/>
           </p:cNvSpPr>
@@ -6795,7 +7148,7 @@
       </p:sp>
       <p:sp>
         <p:nvSpPr>
-          <p:cNvPr id="4" name="Titel 3"/>
+          <p:cNvPr id="5" name="Titel 4"/>
           <p:cNvSpPr>
             <a:spLocks noGrp="1"/>
           </p:cNvSpPr>
@@ -6810,95 +7163,132 @@
           <a:p>
             <a:r>
               <a:rPr lang="de-DE" dirty="0"/>
-              <a:t>Das Beispielprojekt – </a:t>
+              <a:t>Spring Data </a:t>
             </a:r>
             <a:r>
               <a:rPr lang="de-DE" dirty="0" err="1"/>
-              <a:t>Explore</a:t>
-            </a:r>
-            <a:r>
-              <a:rPr lang="de-DE" dirty="0"/>
-              <a:t> </a:t>
-            </a:r>
-            <a:r>
-              <a:rPr lang="de-DE" dirty="0">
-                <a:sym typeface="Wingdings" panose="05000000000000000000" pitchFamily="2" charset="2"/>
-              </a:rPr>
-              <a:t></a:t>
+              <a:t>Queries</a:t>
+            </a:r>
+            <a:r>
+              <a:rPr lang="de-DE" dirty="0"/>
+              <a:t> + </a:t>
+            </a:r>
+            <a:r>
+              <a:rPr lang="de-DE" dirty="0" err="1"/>
+              <a:t>Repositories</a:t>
+            </a:r>
+            <a:endParaRPr lang="en-GB" dirty="0"/>
+          </a:p>
+        </p:txBody>
+      </p:sp>
+      <p:sp>
+        <p:nvSpPr>
+          <p:cNvPr id="6" name="Textplatzhalter 5"/>
+          <p:cNvSpPr>
+            <a:spLocks noGrp="1"/>
+          </p:cNvSpPr>
+          <p:nvPr>
+            <p:ph type="body" sz="quarter" idx="12"/>
+          </p:nvPr>
+        </p:nvSpPr>
+        <p:spPr/>
+        <p:txBody>
+          <a:bodyPr>
+            <a:normAutofit/>
+          </a:bodyPr>
+          <a:lstStyle/>
+          <a:p>
+            <a:r>
+              <a:rPr lang="de-DE" dirty="0" err="1"/>
+              <a:t>Repositories</a:t>
+            </a:r>
+            <a:r>
+              <a:rPr lang="de-DE" dirty="0"/>
+              <a:t> (CRUD, </a:t>
+            </a:r>
+            <a:r>
+              <a:rPr lang="de-DE" dirty="0" err="1"/>
+              <a:t>PagingAndSorting</a:t>
+            </a:r>
+            <a:r>
+              <a:rPr lang="de-DE" dirty="0"/>
+              <a:t> …)</a:t>
+            </a:r>
+          </a:p>
+          <a:p>
+            <a:r>
+              <a:rPr lang="de-DE" dirty="0"/>
+              <a:t>Query </a:t>
+            </a:r>
+            <a:r>
+              <a:rPr lang="de-DE" dirty="0" err="1"/>
+              <a:t>syntax</a:t>
+            </a:r>
+            <a:r>
+              <a:rPr lang="de-DE" dirty="0"/>
+              <a:t> (IDE Unterstützung, </a:t>
+            </a:r>
+            <a:r>
+              <a:rPr lang="de-DE" dirty="0" err="1"/>
+              <a:t>IntelliJ</a:t>
+            </a:r>
+            <a:r>
+              <a:rPr lang="de-DE" dirty="0"/>
+              <a:t>, )</a:t>
+            </a:r>
+          </a:p>
+          <a:p>
+            <a:r>
+              <a:rPr lang="de-DE" dirty="0"/>
+              <a:t>Request </a:t>
+            </a:r>
+            <a:r>
+              <a:rPr lang="de-DE" dirty="0" err="1"/>
+              <a:t>params</a:t>
             </a:r>
             <a:endParaRPr lang="de-DE" dirty="0"/>
           </a:p>
-        </p:txBody>
-      </p:sp>
-      <p:sp>
-        <p:nvSpPr>
-          <p:cNvPr id="9" name="Textplatzhalter 8"/>
-          <p:cNvSpPr>
-            <a:spLocks noGrp="1"/>
-          </p:cNvSpPr>
-          <p:nvPr>
-            <p:ph type="body" sz="quarter" idx="12"/>
-          </p:nvPr>
-        </p:nvSpPr>
-        <p:spPr/>
-        <p:txBody>
-          <a:bodyPr/>
-          <a:lstStyle/>
-          <a:p>
-            <a:r>
-              <a:rPr lang="de-DE" dirty="0"/>
-              <a:t>Projekt von GitHub auschecken ************** LINKS ANPASSEN</a:t>
-            </a:r>
-            <a:br>
-              <a:rPr lang="de-DE" dirty="0"/>
-            </a:br>
-            <a:r>
-              <a:rPr lang="de-DE" dirty="0">
-                <a:hlinkClick r:id="rId2"/>
-              </a:rPr>
-              <a:t>https://github.com/bonnie-chow/springBoot-springData.git</a:t>
-            </a:r>
-            <a:br>
-              <a:rPr lang="de-DE" dirty="0"/>
-            </a:br>
-            <a:r>
-              <a:rPr lang="de-DE" dirty="0">
-                <a:hlinkClick r:id="rId3"/>
-              </a:rPr>
-              <a:t>https://github.com/bonnie-chow/springBoot-springData-client.git</a:t>
+          <a:p>
+            <a:r>
+              <a:rPr lang="de-DE" dirty="0"/>
+              <a:t>Native </a:t>
+            </a:r>
+            <a:r>
+              <a:rPr lang="de-DE" dirty="0" err="1"/>
+              <a:t>Queries</a:t>
             </a:r>
             <a:endParaRPr lang="de-DE" dirty="0"/>
           </a:p>
           <a:p>
-            <a:r>
-              <a:rPr lang="de-DE" dirty="0" err="1"/>
-              <a:t>mvnw</a:t>
-            </a:r>
-            <a:r>
-              <a:rPr lang="de-DE" dirty="0"/>
-              <a:t> clean </a:t>
-            </a:r>
-            <a:r>
-              <a:rPr lang="de-DE" dirty="0" err="1"/>
-              <a:t>install</a:t>
-            </a:r>
             <a:endParaRPr lang="de-DE" dirty="0"/>
           </a:p>
           <a:p>
-            <a:r>
-              <a:rPr lang="de-DE" dirty="0">
-                <a:hlinkClick r:id="rId4"/>
-              </a:rPr>
-              <a:t>http://localhost:8090/agenda</a:t>
-            </a:r>
+            <a:pPr marL="0" indent="0">
+              <a:buNone/>
+            </a:pPr>
             <a:endParaRPr lang="de-DE" dirty="0"/>
+          </a:p>
+          <a:p>
+            <a:pPr marL="0" indent="0">
+              <a:buNone/>
+            </a:pPr>
+            <a:endParaRPr lang="de-DE" dirty="0"/>
+          </a:p>
+          <a:p>
+            <a:pPr marL="0" indent="0">
+              <a:buNone/>
+            </a:pPr>
+            <a:r>
+              <a:rPr lang="de-DE" dirty="0"/>
+              <a:t>https://docs.spring.io/spring-data/jpa/docs/current/reference/html</a:t>
+            </a:r>
           </a:p>
         </p:txBody>
       </p:sp>
     </p:spTree>
     <p:extLst>
       <p:ext uri="{BB962C8B-B14F-4D97-AF65-F5344CB8AC3E}">
-        <p14:creationId xmlns:p14="http://schemas.microsoft.com/office/powerpoint/2010/main" val="579743785"/>
+        <p14:creationId xmlns:p14="http://schemas.microsoft.com/office/powerpoint/2010/main" val="1815258435"/>
       </p:ext>
     </p:extLst>
   </p:cSld>
@@ -6943,8 +7333,8 @@
           <a:lstStyle/>
           <a:p>
             <a:r>
-              <a:rPr lang="de-DE" dirty="0"/>
-              <a:t>15 min</a:t>
+              <a:rPr lang="en-US" dirty="0"/>
+              <a:t>30 min</a:t>
             </a:r>
             <a:endParaRPr lang="en-GB" dirty="0"/>
           </a:p>
@@ -7009,137 +7399,60 @@
         </p:nvSpPr>
         <p:spPr/>
         <p:txBody>
-          <a:bodyPr/>
-          <a:lstStyle/>
-          <a:p>
-            <a:r>
-              <a:rPr lang="de-DE" dirty="0"/>
-              <a:t>Spring Data </a:t>
-            </a:r>
-            <a:r>
-              <a:rPr lang="de-DE" dirty="0" err="1"/>
-              <a:t>Queries</a:t>
-            </a:r>
-            <a:r>
-              <a:rPr lang="de-DE" dirty="0"/>
-              <a:t> + </a:t>
-            </a:r>
-            <a:r>
-              <a:rPr lang="de-DE" dirty="0" err="1"/>
-              <a:t>Repositories</a:t>
-            </a:r>
-            <a:endParaRPr lang="en-GB" dirty="0"/>
-          </a:p>
-        </p:txBody>
-      </p:sp>
-      <p:sp>
-        <p:nvSpPr>
-          <p:cNvPr id="6" name="Textplatzhalter 5"/>
-          <p:cNvSpPr>
-            <a:spLocks noGrp="1"/>
-          </p:cNvSpPr>
-          <p:nvPr>
-            <p:ph type="body" sz="quarter" idx="12"/>
-          </p:nvPr>
-        </p:nvSpPr>
-        <p:spPr/>
-        <p:txBody>
           <a:bodyPr>
             <a:normAutofit/>
           </a:bodyPr>
           <a:lstStyle/>
           <a:p>
             <a:r>
-              <a:rPr lang="de-DE" dirty="0" err="1"/>
-              <a:t>Repositories</a:t>
-            </a:r>
-            <a:r>
-              <a:rPr lang="de-DE" dirty="0"/>
-              <a:t> (CRUD, </a:t>
-            </a:r>
-            <a:r>
-              <a:rPr lang="de-DE" dirty="0" err="1"/>
-              <a:t>PagingAndSorting</a:t>
-            </a:r>
-            <a:r>
-              <a:rPr lang="de-DE" dirty="0"/>
-              <a:t> …)</a:t>
-            </a:r>
-          </a:p>
-          <a:p>
-            <a:r>
-              <a:rPr lang="de-DE" dirty="0"/>
-              <a:t>Query </a:t>
-            </a:r>
-            <a:r>
-              <a:rPr lang="de-DE" dirty="0" err="1"/>
-              <a:t>syntax</a:t>
-            </a:r>
-            <a:r>
-              <a:rPr lang="de-DE" dirty="0"/>
-              <a:t> (IDE Unterstützung, </a:t>
-            </a:r>
-            <a:r>
-              <a:rPr lang="de-DE" dirty="0" err="1"/>
-              <a:t>IntelliJ</a:t>
-            </a:r>
-            <a:r>
-              <a:rPr lang="de-DE" dirty="0"/>
-              <a:t>, )</a:t>
-            </a:r>
-          </a:p>
-          <a:p>
-            <a:r>
-              <a:rPr lang="de-DE" dirty="0"/>
-              <a:t>Request </a:t>
-            </a:r>
-            <a:r>
-              <a:rPr lang="de-DE" dirty="0" err="1"/>
-              <a:t>params</a:t>
-            </a:r>
-            <a:endParaRPr lang="de-DE" dirty="0"/>
-          </a:p>
-          <a:p>
-            <a:r>
-              <a:rPr lang="de-DE" dirty="0"/>
-              <a:t>Native </a:t>
-            </a:r>
-            <a:r>
-              <a:rPr lang="de-DE" dirty="0" err="1"/>
-              <a:t>Queries</a:t>
-            </a:r>
-            <a:endParaRPr lang="de-DE" dirty="0"/>
-          </a:p>
-          <a:p>
-            <a:endParaRPr lang="de-DE" dirty="0"/>
-          </a:p>
-          <a:p>
-            <a:pPr marL="0" indent="0">
-              <a:buNone/>
+              <a:rPr lang="de-DE" dirty="0"/>
+              <a:t>Event Repository erweitern</a:t>
+            </a:r>
+            <a:endParaRPr lang="en-GB" dirty="0"/>
+          </a:p>
+        </p:txBody>
+      </p:sp>
+      <p:sp>
+        <p:nvSpPr>
+          <p:cNvPr id="6" name="Textplatzhalter 5"/>
+          <p:cNvSpPr>
+            <a:spLocks noGrp="1"/>
+          </p:cNvSpPr>
+          <p:nvPr>
+            <p:ph type="body" sz="quarter" idx="12"/>
+          </p:nvPr>
+        </p:nvSpPr>
+        <p:spPr/>
+        <p:txBody>
+          <a:bodyPr/>
+          <a:lstStyle/>
+          <a:p>
+            <a:pPr>
+              <a:buFont typeface="Symbol" panose="05050102010706020507" pitchFamily="18" charset="2"/>
+              <a:buChar char="Þ"/>
             </a:pPr>
-            <a:endParaRPr lang="de-DE" dirty="0"/>
-          </a:p>
-          <a:p>
-            <a:pPr marL="0" indent="0">
-              <a:buNone/>
+            <a:r>
+              <a:rPr lang="de-DE" dirty="0"/>
+              <a:t>um Suche anhand Titel</a:t>
+            </a:r>
+          </a:p>
+          <a:p>
+            <a:pPr>
+              <a:buFont typeface="Symbol" panose="05050102010706020507" pitchFamily="18" charset="2"/>
+              <a:buChar char="Þ"/>
             </a:pPr>
-            <a:endParaRPr lang="de-DE" dirty="0"/>
-          </a:p>
-          <a:p>
-            <a:pPr marL="0" indent="0">
-              <a:buNone/>
-            </a:pPr>
-            <a:r>
-              <a:rPr lang="de-DE" dirty="0"/>
-              <a:t>https://docs.spring.io/spring-data/jpa/docs/current/reference/html</a:t>
-            </a:r>
+            <a:r>
+              <a:rPr lang="de-DE" dirty="0"/>
+              <a:t>Suchseite reparieren!</a:t>
+            </a:r>
+            <a:endParaRPr lang="en-GB" dirty="0"/>
           </a:p>
         </p:txBody>
       </p:sp>
     </p:spTree>
     <p:extLst>
       <p:ext uri="{BB962C8B-B14F-4D97-AF65-F5344CB8AC3E}">
-        <p14:creationId xmlns:p14="http://schemas.microsoft.com/office/powerpoint/2010/main" val="1815258435"/>
+        <p14:creationId xmlns:p14="http://schemas.microsoft.com/office/powerpoint/2010/main" val="204088125"/>
       </p:ext>
     </p:extLst>
   </p:cSld>
@@ -7168,31 +7481,6 @@
       </p:grpSpPr>
       <p:sp>
         <p:nvSpPr>
-          <p:cNvPr id="2" name="Textplatzhalter 1"/>
-          <p:cNvSpPr>
-            <a:spLocks noGrp="1"/>
-          </p:cNvSpPr>
-          <p:nvPr>
-            <p:ph type="body" sz="half" idx="2"/>
-          </p:nvPr>
-        </p:nvSpPr>
-        <p:spPr/>
-        <p:txBody>
-          <a:bodyPr>
-            <a:normAutofit fontScale="85000" lnSpcReduction="10000"/>
-          </a:bodyPr>
-          <a:lstStyle/>
-          <a:p>
-            <a:r>
-              <a:rPr lang="en-US" dirty="0"/>
-              <a:t>30 min</a:t>
-            </a:r>
-            <a:endParaRPr lang="en-GB" dirty="0"/>
-          </a:p>
-        </p:txBody>
-      </p:sp>
-      <p:sp>
-        <p:nvSpPr>
           <p:cNvPr id="3" name="Fußzeilenplatzhalter 2"/>
           <p:cNvSpPr>
             <a:spLocks noGrp="1"/>
@@ -7250,60 +7538,51 @@
         </p:nvSpPr>
         <p:spPr/>
         <p:txBody>
-          <a:bodyPr>
-            <a:normAutofit/>
-          </a:bodyPr>
-          <a:lstStyle/>
-          <a:p>
-            <a:r>
-              <a:rPr lang="de-DE" dirty="0"/>
-              <a:t>Event Repository erweitern</a:t>
+          <a:bodyPr/>
+          <a:lstStyle/>
+          <a:p>
+            <a:r>
+              <a:rPr lang="de-DE" dirty="0"/>
+              <a:t>Test Pyramide</a:t>
             </a:r>
             <a:endParaRPr lang="en-GB" dirty="0"/>
           </a:p>
         </p:txBody>
       </p:sp>
-      <p:sp>
-        <p:nvSpPr>
-          <p:cNvPr id="6" name="Textplatzhalter 5"/>
-          <p:cNvSpPr>
-            <a:spLocks noGrp="1"/>
-          </p:cNvSpPr>
-          <p:nvPr>
-            <p:ph type="body" sz="quarter" idx="12"/>
-          </p:nvPr>
-        </p:nvSpPr>
-        <p:spPr/>
-        <p:txBody>
-          <a:bodyPr/>
-          <a:lstStyle/>
-          <a:p>
-            <a:pPr>
-              <a:buFont typeface="Symbol" panose="05050102010706020507" pitchFamily="18" charset="2"/>
-              <a:buChar char="Þ"/>
-            </a:pPr>
-            <a:r>
-              <a:rPr lang="de-DE" dirty="0"/>
-              <a:t>um Suche anhand Titel</a:t>
-            </a:r>
-          </a:p>
-          <a:p>
-            <a:pPr>
-              <a:buFont typeface="Symbol" panose="05050102010706020507" pitchFamily="18" charset="2"/>
-              <a:buChar char="Þ"/>
-            </a:pPr>
-            <a:r>
-              <a:rPr lang="de-DE" dirty="0"/>
-              <a:t>Suchseite reparieren!</a:t>
-            </a:r>
-            <a:endParaRPr lang="en-GB" dirty="0"/>
-          </a:p>
-        </p:txBody>
-      </p:sp>
+      <p:pic>
+        <p:nvPicPr>
+          <p:cNvPr id="8" name="Grafik 7">
+            <a:extLst>
+              <a:ext uri="{FF2B5EF4-FFF2-40B4-BE49-F238E27FC236}">
+                <a16:creationId xmlns:a16="http://schemas.microsoft.com/office/drawing/2014/main" id="{B7FA2F16-7A8E-4172-8A76-296DFB9E8272}"/>
+              </a:ext>
+            </a:extLst>
+          </p:cNvPr>
+          <p:cNvPicPr>
+            <a:picLocks noChangeAspect="1"/>
+          </p:cNvPicPr>
+          <p:nvPr/>
+        </p:nvPicPr>
+        <p:blipFill>
+          <a:blip r:embed="rId2"/>
+          <a:stretch>
+            <a:fillRect/>
+          </a:stretch>
+        </p:blipFill>
+        <p:spPr>
+          <a:xfrm>
+            <a:off x="2025102" y="704886"/>
+            <a:ext cx="4929942" cy="4302991"/>
+          </a:xfrm>
+          <a:prstGeom prst="rect">
+            <a:avLst/>
+          </a:prstGeom>
+        </p:spPr>
+      </p:pic>
     </p:spTree>
     <p:extLst>
       <p:ext uri="{BB962C8B-B14F-4D97-AF65-F5344CB8AC3E}">
-        <p14:creationId xmlns:p14="http://schemas.microsoft.com/office/powerpoint/2010/main" val="204088125"/>
+        <p14:creationId xmlns:p14="http://schemas.microsoft.com/office/powerpoint/2010/main" val="1180044002"/>
       </p:ext>
     </p:extLst>
   </p:cSld>
@@ -7332,31 +7611,6 @@
       </p:grpSpPr>
       <p:sp>
         <p:nvSpPr>
-          <p:cNvPr id="2" name="Textplatzhalter 1"/>
-          <p:cNvSpPr>
-            <a:spLocks noGrp="1"/>
-          </p:cNvSpPr>
-          <p:nvPr>
-            <p:ph type="body" sz="half" idx="2"/>
-          </p:nvPr>
-        </p:nvSpPr>
-        <p:spPr/>
-        <p:txBody>
-          <a:bodyPr>
-            <a:normAutofit fontScale="85000" lnSpcReduction="10000"/>
-          </a:bodyPr>
-          <a:lstStyle/>
-          <a:p>
-            <a:r>
-              <a:rPr lang="de-DE" dirty="0"/>
-              <a:t>30 min</a:t>
-            </a:r>
-            <a:endParaRPr lang="en-GB" dirty="0"/>
-          </a:p>
-        </p:txBody>
-      </p:sp>
-      <p:sp>
-        <p:nvSpPr>
           <p:cNvPr id="3" name="Fußzeilenplatzhalter 2"/>
           <p:cNvSpPr>
             <a:spLocks noGrp="1"/>
@@ -7419,7 +7673,7 @@
           <a:p>
             <a:r>
               <a:rPr lang="de-DE" dirty="0"/>
-              <a:t>Integrationstests</a:t>
+              <a:t>Integrationstests mit Spring Boot</a:t>
             </a:r>
             <a:endParaRPr lang="en-GB" dirty="0"/>
           </a:p>
@@ -7427,7 +7681,7 @@
       </p:sp>
       <p:sp>
         <p:nvSpPr>
-          <p:cNvPr id="6" name="Textplatzhalter 5"/>
+          <p:cNvPr id="2" name="Textplatzhalter 1"/>
           <p:cNvSpPr>
             <a:spLocks noGrp="1"/>
           </p:cNvSpPr>
@@ -7437,31 +7691,152 @@
         </p:nvSpPr>
         <p:spPr/>
         <p:txBody>
-          <a:bodyPr/>
-          <a:lstStyle/>
-          <a:p>
-            <a:r>
-              <a:rPr lang="de-DE" dirty="0"/>
-              <a:t>………………………???</a:t>
-            </a:r>
-          </a:p>
-          <a:p>
-            <a:r>
-              <a:rPr lang="de-DE" dirty="0"/>
-              <a:t>Test Pyramide</a:t>
-            </a:r>
-          </a:p>
-          <a:p>
-            <a:r>
-              <a:rPr lang="de-DE" dirty="0"/>
-              <a:t>Warum gut</a:t>
-            </a:r>
-          </a:p>
-          <a:p>
-            <a:r>
-              <a:rPr lang="de-DE" dirty="0"/>
-              <a:t>Was ist</a:t>
-            </a:r>
+          <a:bodyPr>
+            <a:normAutofit/>
+          </a:bodyPr>
+          <a:lstStyle/>
+          <a:p>
+            <a:r>
+              <a:rPr lang="en-US" dirty="0"/>
+              <a:t>@</a:t>
+            </a:r>
+            <a:r>
+              <a:rPr lang="en-US" dirty="0" err="1"/>
+              <a:t>SpringBootTest</a:t>
+            </a:r>
+            <a:r>
+              <a:rPr lang="en-US" dirty="0"/>
+              <a:t> – </a:t>
+            </a:r>
+            <a:r>
+              <a:rPr lang="en-US" dirty="0" err="1"/>
+              <a:t>kompletter</a:t>
+            </a:r>
+            <a:r>
+              <a:rPr lang="en-US" dirty="0"/>
+              <a:t> Test </a:t>
+            </a:r>
+            <a:r>
+              <a:rPr lang="en-US" dirty="0" err="1"/>
+              <a:t>mit</a:t>
+            </a:r>
+            <a:r>
+              <a:rPr lang="en-US" dirty="0"/>
+              <a:t> </a:t>
+            </a:r>
+            <a:r>
+              <a:rPr lang="en-US" dirty="0" err="1"/>
+              <a:t>echtem</a:t>
+            </a:r>
+            <a:r>
+              <a:rPr lang="en-US" dirty="0"/>
+              <a:t> Server</a:t>
+            </a:r>
+          </a:p>
+          <a:p>
+            <a:r>
+              <a:rPr lang="en-US" dirty="0"/>
+              <a:t>@</a:t>
+            </a:r>
+            <a:r>
+              <a:rPr lang="en-US" dirty="0" err="1"/>
+              <a:t>DataJpaTest</a:t>
+            </a:r>
+            <a:r>
+              <a:rPr lang="en-US" dirty="0"/>
+              <a:t> – </a:t>
+            </a:r>
+            <a:r>
+              <a:rPr lang="en-US" dirty="0" err="1"/>
+              <a:t>DataLayerTest</a:t>
+            </a:r>
+            <a:endParaRPr lang="en-US" dirty="0"/>
+          </a:p>
+          <a:p>
+            <a:pPr marL="0" indent="0">
+              <a:buNone/>
+            </a:pPr>
+            <a:endParaRPr lang="en-US" dirty="0"/>
+          </a:p>
+          <a:p>
+            <a:r>
+              <a:rPr lang="en-US" dirty="0"/>
+              <a:t>@</a:t>
+            </a:r>
+            <a:r>
+              <a:rPr lang="en-US" dirty="0" err="1"/>
+              <a:t>WebMvcTest</a:t>
+            </a:r>
+            <a:r>
+              <a:rPr lang="en-US" dirty="0"/>
+              <a:t> </a:t>
+            </a:r>
+            <a:r>
+              <a:rPr lang="en-US" dirty="0" err="1"/>
+              <a:t>mit</a:t>
+            </a:r>
+            <a:r>
+              <a:rPr lang="en-US" dirty="0"/>
+              <a:t> @</a:t>
+            </a:r>
+            <a:r>
+              <a:rPr lang="en-US" dirty="0" err="1"/>
+              <a:t>MockBean</a:t>
+            </a:r>
+            <a:r>
+              <a:rPr lang="en-US" dirty="0"/>
+              <a:t> – </a:t>
+            </a:r>
+            <a:r>
+              <a:rPr lang="en-US" dirty="0" err="1"/>
+              <a:t>ControllerTest</a:t>
+            </a:r>
+            <a:r>
+              <a:rPr lang="en-US" dirty="0"/>
+              <a:t> </a:t>
+            </a:r>
+            <a:r>
+              <a:rPr lang="en-US" dirty="0" err="1"/>
+              <a:t>mit</a:t>
+            </a:r>
+            <a:r>
+              <a:rPr lang="en-US" dirty="0"/>
+              <a:t> </a:t>
+            </a:r>
+            <a:r>
+              <a:rPr lang="en-US" dirty="0" err="1"/>
+              <a:t>gemockten</a:t>
+            </a:r>
+            <a:r>
+              <a:rPr lang="en-US" dirty="0"/>
+              <a:t> </a:t>
+            </a:r>
+            <a:r>
+              <a:rPr lang="en-US" dirty="0" err="1"/>
+              <a:t>Abh</a:t>
+            </a:r>
+            <a:r>
+              <a:rPr lang="de-DE" dirty="0" err="1"/>
+              <a:t>ängigkeiten</a:t>
+            </a:r>
+            <a:endParaRPr lang="de-DE" dirty="0"/>
+          </a:p>
+          <a:p>
+            <a:endParaRPr lang="en-US" dirty="0"/>
+          </a:p>
+          <a:p>
+            <a:endParaRPr lang="en-US" dirty="0"/>
+          </a:p>
+          <a:p>
+            <a:endParaRPr lang="en-US" dirty="0"/>
+          </a:p>
+          <a:p>
+            <a:endParaRPr lang="en-US" dirty="0"/>
+          </a:p>
+          <a:p>
+            <a:endParaRPr lang="de-DE" dirty="0"/>
+          </a:p>
+          <a:p>
             <a:endParaRPr lang="en-GB" dirty="0"/>
           </a:p>
         </p:txBody>
@@ -7469,7 +7844,7 @@
     </p:spTree>
     <p:extLst>
       <p:ext uri="{BB962C8B-B14F-4D97-AF65-F5344CB8AC3E}">
-        <p14:creationId xmlns:p14="http://schemas.microsoft.com/office/powerpoint/2010/main" val="1180044002"/>
+        <p14:creationId xmlns:p14="http://schemas.microsoft.com/office/powerpoint/2010/main" val="3571236127"/>
       </p:ext>
     </p:extLst>
   </p:cSld>
@@ -8769,6 +9144,15 @@
 </file>
 
 <file path=customXml/item2.xml><?xml version="1.0" encoding="utf-8"?>
+<p:properties xmlns:p="http://schemas.microsoft.com/office/2006/metadata/properties" xmlns:xsi="http://www.w3.org/2001/XMLSchema-instance" xmlns:pc="http://schemas.microsoft.com/office/infopath/2007/PartnerControls">
+  <documentManagement>
+    <_Version xmlns="http://schemas.microsoft.com/sharepoint/v3/fields" xsi:nil="true"/>
+    <_Status xmlns="http://schemas.microsoft.com/sharepoint/v3/fields">Not Started</_Status>
+  </documentManagement>
+</p:properties>
+</file>
+
+<file path=customXml/item3.xml><?xml version="1.0" encoding="utf-8"?>
 <ct:contentTypeSchema xmlns:ct="http://schemas.microsoft.com/office/2006/metadata/contentType" xmlns:ma="http://schemas.microsoft.com/office/2006/metadata/properties/metaAttributes" ct:_="" ma:_="" ma:contentTypeName="Document" ma:contentTypeID="0x0101000DE64AEEDD9B7A4D93545ACBE97D4615" ma:contentTypeVersion="2" ma:contentTypeDescription="Create a new document." ma:contentTypeScope="" ma:versionID="f49002b78e3a4a71b814eef46a983816">
   <xsd:schema xmlns:xsd="http://www.w3.org/2001/XMLSchema" xmlns:xs="http://www.w3.org/2001/XMLSchema" xmlns:p="http://schemas.microsoft.com/office/2006/metadata/properties" xmlns:ns2="http://schemas.microsoft.com/sharepoint/v3/fields" targetNamespace="http://schemas.microsoft.com/office/2006/metadata/properties" ma:root="true" ma:fieldsID="38f6db2dd0d9a0cf6a8dc37be32b365b" ns2:_="">
     <xsd:import namespace="http://schemas.microsoft.com/sharepoint/v3/fields"/>
@@ -8912,15 +9296,6 @@
 </ct:contentTypeSchema>
 </file>
 
-<file path=customXml/item3.xml><?xml version="1.0" encoding="utf-8"?>
-<p:properties xmlns:p="http://schemas.microsoft.com/office/2006/metadata/properties" xmlns:xsi="http://www.w3.org/2001/XMLSchema-instance" xmlns:pc="http://schemas.microsoft.com/office/infopath/2007/PartnerControls">
-  <documentManagement>
-    <_Version xmlns="http://schemas.microsoft.com/sharepoint/v3/fields" xsi:nil="true"/>
-    <_Status xmlns="http://schemas.microsoft.com/sharepoint/v3/fields">Not Started</_Status>
-  </documentManagement>
-</p:properties>
-</file>
-
 <file path=customXml/itemProps1.xml><?xml version="1.0" encoding="utf-8"?>
 <ds:datastoreItem xmlns:ds="http://schemas.openxmlformats.org/officeDocument/2006/customXml" ds:itemID="{87D2A1B0-FF3E-4009-940D-AED0EB70AA20}">
   <ds:schemaRefs>
@@ -8930,6 +9305,22 @@
 </file>
 
 <file path=customXml/itemProps2.xml><?xml version="1.0" encoding="utf-8"?>
+<ds:datastoreItem xmlns:ds="http://schemas.openxmlformats.org/officeDocument/2006/customXml" ds:itemID="{7B6F2769-7194-4217-93D3-3AF3A4742282}">
+  <ds:schemaRefs>
+    <ds:schemaRef ds:uri="http://schemas.microsoft.com/office/infopath/2007/PartnerControls"/>
+    <ds:schemaRef ds:uri="http://purl.org/dc/elements/1.1/"/>
+    <ds:schemaRef ds:uri="http://schemas.microsoft.com/office/2006/documentManagement/types"/>
+    <ds:schemaRef ds:uri="http://schemas.openxmlformats.org/package/2006/metadata/core-properties"/>
+    <ds:schemaRef ds:uri="http://purl.org/dc/dcmitype/"/>
+    <ds:schemaRef ds:uri="http://purl.org/dc/terms/"/>
+    <ds:schemaRef ds:uri="http://schemas.microsoft.com/sharepoint/v3/fields"/>
+    <ds:schemaRef ds:uri="http://schemas.microsoft.com/office/2006/metadata/properties"/>
+    <ds:schemaRef ds:uri="http://www.w3.org/XML/1998/namespace"/>
+  </ds:schemaRefs>
+</ds:datastoreItem>
+</file>
+
+<file path=customXml/itemProps3.xml><?xml version="1.0" encoding="utf-8"?>
 <ds:datastoreItem xmlns:ds="http://schemas.openxmlformats.org/officeDocument/2006/customXml" ds:itemID="{E4214858-785C-42F7-BE66-6D0E79395FC8}">
   <ds:schemaRefs>
     <ds:schemaRef ds:uri="http://schemas.microsoft.com/office/2006/metadata/contentType"/>
@@ -8945,20 +9336,4 @@
     <ds:schemaRef ds:uri="http://schemas.microsoft.com/internal/obd"/>
   </ds:schemaRefs>
 </ds:datastoreItem>
-</file>
-
-<file path=customXml/itemProps3.xml><?xml version="1.0" encoding="utf-8"?>
-<ds:datastoreItem xmlns:ds="http://schemas.openxmlformats.org/officeDocument/2006/customXml" ds:itemID="{7B6F2769-7194-4217-93D3-3AF3A4742282}">
-  <ds:schemaRefs>
-    <ds:schemaRef ds:uri="http://schemas.microsoft.com/office/infopath/2007/PartnerControls"/>
-    <ds:schemaRef ds:uri="http://purl.org/dc/elements/1.1/"/>
-    <ds:schemaRef ds:uri="http://schemas.microsoft.com/office/2006/documentManagement/types"/>
-    <ds:schemaRef ds:uri="http://schemas.openxmlformats.org/package/2006/metadata/core-properties"/>
-    <ds:schemaRef ds:uri="http://purl.org/dc/dcmitype/"/>
-    <ds:schemaRef ds:uri="http://purl.org/dc/terms/"/>
-    <ds:schemaRef ds:uri="http://schemas.microsoft.com/sharepoint/v3/fields"/>
-    <ds:schemaRef ds:uri="http://schemas.microsoft.com/office/2006/metadata/properties"/>
-    <ds:schemaRef ds:uri="http://www.w3.org/XML/1998/namespace"/>
-  </ds:schemaRefs>
-</ds:datastoreItem>
 </file>
</xml_diff>